<commit_message>
Solution of Problem 1 (V01)
</commit_message>
<xml_diff>
--- a/tests/Take-home-exam.pptx
+++ b/tests/Take-home-exam.pptx
@@ -245,7 +245,7 @@
           <a:p>
             <a:fld id="{A84ED84F-DF96-450D-9395-28FCBD467BD1}" type="datetimeFigureOut">
               <a:rPr lang="zh-TW" altLang="en-US" smtClean="0"/>
-              <a:t>2022/01/05</a:t>
+              <a:t>2022/01/06</a:t>
             </a:fld>
             <a:endParaRPr lang="zh-TW" altLang="en-US"/>
           </a:p>
@@ -415,7 +415,7 @@
           <a:p>
             <a:fld id="{A84ED84F-DF96-450D-9395-28FCBD467BD1}" type="datetimeFigureOut">
               <a:rPr lang="zh-TW" altLang="en-US" smtClean="0"/>
-              <a:t>2022/01/05</a:t>
+              <a:t>2022/01/06</a:t>
             </a:fld>
             <a:endParaRPr lang="zh-TW" altLang="en-US"/>
           </a:p>
@@ -595,7 +595,7 @@
           <a:p>
             <a:fld id="{A84ED84F-DF96-450D-9395-28FCBD467BD1}" type="datetimeFigureOut">
               <a:rPr lang="zh-TW" altLang="en-US" smtClean="0"/>
-              <a:t>2022/01/05</a:t>
+              <a:t>2022/01/06</a:t>
             </a:fld>
             <a:endParaRPr lang="zh-TW" altLang="en-US"/>
           </a:p>
@@ -765,7 +765,7 @@
           <a:p>
             <a:fld id="{A84ED84F-DF96-450D-9395-28FCBD467BD1}" type="datetimeFigureOut">
               <a:rPr lang="zh-TW" altLang="en-US" smtClean="0"/>
-              <a:t>2022/01/05</a:t>
+              <a:t>2022/01/06</a:t>
             </a:fld>
             <a:endParaRPr lang="zh-TW" altLang="en-US"/>
           </a:p>
@@ -1009,7 +1009,7 @@
           <a:p>
             <a:fld id="{A84ED84F-DF96-450D-9395-28FCBD467BD1}" type="datetimeFigureOut">
               <a:rPr lang="zh-TW" altLang="en-US" smtClean="0"/>
-              <a:t>2022/01/05</a:t>
+              <a:t>2022/01/06</a:t>
             </a:fld>
             <a:endParaRPr lang="zh-TW" altLang="en-US"/>
           </a:p>
@@ -1241,7 +1241,7 @@
           <a:p>
             <a:fld id="{A84ED84F-DF96-450D-9395-28FCBD467BD1}" type="datetimeFigureOut">
               <a:rPr lang="zh-TW" altLang="en-US" smtClean="0"/>
-              <a:t>2022/01/05</a:t>
+              <a:t>2022/01/06</a:t>
             </a:fld>
             <a:endParaRPr lang="zh-TW" altLang="en-US"/>
           </a:p>
@@ -1608,7 +1608,7 @@
           <a:p>
             <a:fld id="{A84ED84F-DF96-450D-9395-28FCBD467BD1}" type="datetimeFigureOut">
               <a:rPr lang="zh-TW" altLang="en-US" smtClean="0"/>
-              <a:t>2022/01/05</a:t>
+              <a:t>2022/01/06</a:t>
             </a:fld>
             <a:endParaRPr lang="zh-TW" altLang="en-US"/>
           </a:p>
@@ -1726,7 +1726,7 @@
           <a:p>
             <a:fld id="{A84ED84F-DF96-450D-9395-28FCBD467BD1}" type="datetimeFigureOut">
               <a:rPr lang="zh-TW" altLang="en-US" smtClean="0"/>
-              <a:t>2022/01/05</a:t>
+              <a:t>2022/01/06</a:t>
             </a:fld>
             <a:endParaRPr lang="zh-TW" altLang="en-US"/>
           </a:p>
@@ -1821,7 +1821,7 @@
           <a:p>
             <a:fld id="{A84ED84F-DF96-450D-9395-28FCBD467BD1}" type="datetimeFigureOut">
               <a:rPr lang="zh-TW" altLang="en-US" smtClean="0"/>
-              <a:t>2022/01/05</a:t>
+              <a:t>2022/01/06</a:t>
             </a:fld>
             <a:endParaRPr lang="zh-TW" altLang="en-US"/>
           </a:p>
@@ -2098,7 +2098,7 @@
           <a:p>
             <a:fld id="{A84ED84F-DF96-450D-9395-28FCBD467BD1}" type="datetimeFigureOut">
               <a:rPr lang="zh-TW" altLang="en-US" smtClean="0"/>
-              <a:t>2022/01/05</a:t>
+              <a:t>2022/01/06</a:t>
             </a:fld>
             <a:endParaRPr lang="zh-TW" altLang="en-US"/>
           </a:p>
@@ -2355,7 +2355,7 @@
           <a:p>
             <a:fld id="{A84ED84F-DF96-450D-9395-28FCBD467BD1}" type="datetimeFigureOut">
               <a:rPr lang="zh-TW" altLang="en-US" smtClean="0"/>
-              <a:t>2022/01/05</a:t>
+              <a:t>2022/01/06</a:t>
             </a:fld>
             <a:endParaRPr lang="zh-TW" altLang="en-US"/>
           </a:p>
@@ -2568,7 +2568,7 @@
           <a:p>
             <a:fld id="{A84ED84F-DF96-450D-9395-28FCBD467BD1}" type="datetimeFigureOut">
               <a:rPr lang="zh-TW" altLang="en-US" smtClean="0"/>
-              <a:t>2022/01/05</a:t>
+              <a:t>2022/01/06</a:t>
             </a:fld>
             <a:endParaRPr lang="zh-TW" altLang="en-US"/>
           </a:p>

</xml_diff>